<commit_message>
[ DOC ] update front page image
</commit_message>
<xml_diff>
--- a/doc/images/USB4x3HUB_block.pptx
+++ b/doc/images/USB4x3HUB_block.pptx
@@ -104,17 +104,18 @@
       </a:defRPr>
     </a:lvl9pPr>
   </p:defaultTextStyle>
+  <p:extLst>
+    <p:ext uri="{EFAFB233-063F-42B5-8137-9DF3F51BA10A}">
+      <p15:sldGuideLst xmlns:p15="http://schemas.microsoft.com/office/powerpoint/2012/main"/>
+    </p:ext>
+  </p:extLst>
 </p:presentation>
 </file>
 
 <file path=ppt/commentAuthors.xml><?xml version="1.0" encoding="utf-8"?>
 <p:cmAuthorLst xmlns:a="http://schemas.openxmlformats.org/drawingml/2006/main" xmlns:r="http://schemas.openxmlformats.org/officeDocument/2006/relationships" xmlns:p="http://schemas.openxmlformats.org/presentationml/2006/main">
   <p:cmAuthor id="1" name="Kazuki Yamamoto" initials="KY" lastIdx="1" clrIdx="0">
-    <p:extLst>
-      <p:ext uri="{19B8F6BF-5375-455C-9EA6-DF929625EA0E}">
-        <p15:presenceInfo xmlns:p15="http://schemas.microsoft.com/office/powerpoint/2012/main" userId="" providerId=""/>
-      </p:ext>
-    </p:extLst>
+    <p:extLst/>
   </p:cmAuthor>
 </p:cmAuthorLst>
 </file>
@@ -264,7 +265,7 @@
           <a:p>
             <a:fld id="{5C0B57D7-42F5-1A41-B05E-91D3A69D08AA}" type="datetimeFigureOut">
               <a:rPr kumimoji="1" lang="ja-JP" altLang="en-US" smtClean="0"/>
-              <a:t>2017/3/29</a:t>
+              <a:t>2017/4/5</a:t>
             </a:fld>
             <a:endParaRPr kumimoji="1" lang="ja-JP" altLang="en-US"/>
           </a:p>
@@ -466,7 +467,7 @@
           <a:p>
             <a:fld id="{5C0B57D7-42F5-1A41-B05E-91D3A69D08AA}" type="datetimeFigureOut">
               <a:rPr kumimoji="1" lang="ja-JP" altLang="en-US" smtClean="0"/>
-              <a:t>2017/3/29</a:t>
+              <a:t>2017/4/5</a:t>
             </a:fld>
             <a:endParaRPr kumimoji="1" lang="ja-JP" altLang="en-US"/>
           </a:p>
@@ -678,7 +679,7 @@
           <a:p>
             <a:fld id="{5C0B57D7-42F5-1A41-B05E-91D3A69D08AA}" type="datetimeFigureOut">
               <a:rPr kumimoji="1" lang="ja-JP" altLang="en-US" smtClean="0"/>
-              <a:t>2017/3/29</a:t>
+              <a:t>2017/4/5</a:t>
             </a:fld>
             <a:endParaRPr kumimoji="1" lang="ja-JP" altLang="en-US"/>
           </a:p>
@@ -880,7 +881,7 @@
           <a:p>
             <a:fld id="{5C0B57D7-42F5-1A41-B05E-91D3A69D08AA}" type="datetimeFigureOut">
               <a:rPr kumimoji="1" lang="ja-JP" altLang="en-US" smtClean="0"/>
-              <a:t>2017/3/29</a:t>
+              <a:t>2017/4/5</a:t>
             </a:fld>
             <a:endParaRPr kumimoji="1" lang="ja-JP" altLang="en-US"/>
           </a:p>
@@ -1126,7 +1127,7 @@
           <a:p>
             <a:fld id="{5C0B57D7-42F5-1A41-B05E-91D3A69D08AA}" type="datetimeFigureOut">
               <a:rPr kumimoji="1" lang="ja-JP" altLang="en-US" smtClean="0"/>
-              <a:t>2017/3/29</a:t>
+              <a:t>2017/4/5</a:t>
             </a:fld>
             <a:endParaRPr kumimoji="1" lang="ja-JP" altLang="en-US"/>
           </a:p>
@@ -1422,7 +1423,7 @@
           <a:p>
             <a:fld id="{5C0B57D7-42F5-1A41-B05E-91D3A69D08AA}" type="datetimeFigureOut">
               <a:rPr kumimoji="1" lang="ja-JP" altLang="en-US" smtClean="0"/>
-              <a:t>2017/3/29</a:t>
+              <a:t>2017/4/5</a:t>
             </a:fld>
             <a:endParaRPr kumimoji="1" lang="ja-JP" altLang="en-US"/>
           </a:p>
@@ -1853,7 +1854,7 @@
           <a:p>
             <a:fld id="{5C0B57D7-42F5-1A41-B05E-91D3A69D08AA}" type="datetimeFigureOut">
               <a:rPr kumimoji="1" lang="ja-JP" altLang="en-US" smtClean="0"/>
-              <a:t>2017/3/29</a:t>
+              <a:t>2017/4/5</a:t>
             </a:fld>
             <a:endParaRPr kumimoji="1" lang="ja-JP" altLang="en-US"/>
           </a:p>
@@ -1971,7 +1972,7 @@
           <a:p>
             <a:fld id="{5C0B57D7-42F5-1A41-B05E-91D3A69D08AA}" type="datetimeFigureOut">
               <a:rPr kumimoji="1" lang="ja-JP" altLang="en-US" smtClean="0"/>
-              <a:t>2017/3/29</a:t>
+              <a:t>2017/4/5</a:t>
             </a:fld>
             <a:endParaRPr kumimoji="1" lang="ja-JP" altLang="en-US"/>
           </a:p>
@@ -2066,7 +2067,7 @@
           <a:p>
             <a:fld id="{5C0B57D7-42F5-1A41-B05E-91D3A69D08AA}" type="datetimeFigureOut">
               <a:rPr kumimoji="1" lang="ja-JP" altLang="en-US" smtClean="0"/>
-              <a:t>2017/3/29</a:t>
+              <a:t>2017/4/5</a:t>
             </a:fld>
             <a:endParaRPr kumimoji="1" lang="ja-JP" altLang="en-US"/>
           </a:p>
@@ -2375,7 +2376,7 @@
           <a:p>
             <a:fld id="{5C0B57D7-42F5-1A41-B05E-91D3A69D08AA}" type="datetimeFigureOut">
               <a:rPr kumimoji="1" lang="ja-JP" altLang="en-US" smtClean="0"/>
-              <a:t>2017/3/29</a:t>
+              <a:t>2017/4/5</a:t>
             </a:fld>
             <a:endParaRPr kumimoji="1" lang="ja-JP" altLang="en-US"/>
           </a:p>
@@ -2628,7 +2629,7 @@
           <a:p>
             <a:fld id="{5C0B57D7-42F5-1A41-B05E-91D3A69D08AA}" type="datetimeFigureOut">
               <a:rPr kumimoji="1" lang="ja-JP" altLang="en-US" smtClean="0"/>
-              <a:t>2017/3/29</a:t>
+              <a:t>2017/4/5</a:t>
             </a:fld>
             <a:endParaRPr kumimoji="1" lang="ja-JP" altLang="en-US"/>
           </a:p>
@@ -2873,7 +2874,7 @@
           <a:p>
             <a:fld id="{5C0B57D7-42F5-1A41-B05E-91D3A69D08AA}" type="datetimeFigureOut">
               <a:rPr kumimoji="1" lang="ja-JP" altLang="en-US" smtClean="0"/>
-              <a:t>2017/3/29</a:t>
+              <a:t>2017/4/5</a:t>
             </a:fld>
             <a:endParaRPr kumimoji="1" lang="ja-JP" altLang="en-US"/>
           </a:p>
@@ -3264,6 +3265,14 @@
 <file path=ppt/slides/slide1.xml><?xml version="1.0" encoding="utf-8"?>
 <p:sld xmlns:a="http://schemas.openxmlformats.org/drawingml/2006/main" xmlns:r="http://schemas.openxmlformats.org/officeDocument/2006/relationships" xmlns:p="http://schemas.openxmlformats.org/presentationml/2006/main">
   <p:cSld>
+    <p:bg>
+      <p:bgPr>
+        <a:solidFill>
+          <a:schemeClr val="bg1"/>
+        </a:solidFill>
+        <a:effectLst/>
+      </p:bgPr>
+    </p:bg>
     <p:spTree>
       <p:nvGrpSpPr>
         <p:cNvPr id="1" name=""/>
@@ -3280,35 +3289,82 @@
       </p:grpSpPr>
       <p:grpSp>
         <p:nvGrpSpPr>
-          <p:cNvPr id="53" name="図形グループ 52"/>
+          <p:cNvPr id="19" name="図形グループ 18"/>
           <p:cNvGrpSpPr/>
           <p:nvPr/>
         </p:nvGrpSpPr>
         <p:grpSpPr>
           <a:xfrm>
-            <a:off x="1677229" y="1272675"/>
-            <a:ext cx="8953524" cy="4347000"/>
-            <a:chOff x="1677229" y="1272675"/>
-            <a:chExt cx="8953524" cy="4347000"/>
+            <a:off x="1581138" y="1083590"/>
+            <a:ext cx="8953525" cy="4725169"/>
+            <a:chOff x="1581138" y="1083590"/>
+            <a:chExt cx="8953525" cy="4725169"/>
           </a:xfrm>
         </p:grpSpPr>
+        <p:sp>
+          <p:nvSpPr>
+            <p:cNvPr id="17" name="正方形/長方形 16"/>
+            <p:cNvSpPr/>
+            <p:nvPr/>
+          </p:nvSpPr>
+          <p:spPr>
+            <a:xfrm>
+              <a:off x="1581139" y="1083590"/>
+              <a:ext cx="8953524" cy="4725169"/>
+            </a:xfrm>
+            <a:prstGeom prst="rect">
+              <a:avLst/>
+            </a:prstGeom>
+            <a:solidFill>
+              <a:schemeClr val="bg1"/>
+            </a:solidFill>
+            <a:ln>
+              <a:noFill/>
+            </a:ln>
+          </p:spPr>
+          <p:style>
+            <a:lnRef idx="2">
+              <a:schemeClr val="accent1">
+                <a:shade val="50000"/>
+              </a:schemeClr>
+            </a:lnRef>
+            <a:fillRef idx="1">
+              <a:schemeClr val="accent1"/>
+            </a:fillRef>
+            <a:effectRef idx="0">
+              <a:schemeClr val="accent1"/>
+            </a:effectRef>
+            <a:fontRef idx="minor">
+              <a:schemeClr val="lt1"/>
+            </a:fontRef>
+          </p:style>
+          <p:txBody>
+            <a:bodyPr rtlCol="0" anchor="ctr"/>
+            <a:lstStyle/>
+            <a:p>
+              <a:pPr algn="ctr"/>
+              <a:endParaRPr kumimoji="1" lang="ja-JP" altLang="en-US"/>
+            </a:p>
+          </p:txBody>
+        </p:sp>
         <p:grpSp>
           <p:nvGrpSpPr>
-            <p:cNvPr id="41" name="図形グループ 40"/>
+            <p:cNvPr id="2" name="図形グループ 1"/>
             <p:cNvGrpSpPr/>
             <p:nvPr/>
           </p:nvGrpSpPr>
           <p:grpSpPr>
             <a:xfrm>
-              <a:off x="1677229" y="1272675"/>
-              <a:ext cx="8953524" cy="4347000"/>
+              <a:off x="1581138" y="1202784"/>
+              <a:ext cx="8953524" cy="4486779"/>
               <a:chOff x="1677229" y="1272675"/>
-              <a:chExt cx="8953524" cy="4347000"/>
+              <a:chExt cx="8953524" cy="4486779"/>
             </a:xfrm>
+            <a:noFill/>
           </p:grpSpPr>
           <p:grpSp>
             <p:nvGrpSpPr>
-              <p:cNvPr id="36" name="図形グループ 35"/>
+              <p:cNvPr id="53" name="図形グループ 52"/>
               <p:cNvGrpSpPr/>
               <p:nvPr/>
             </p:nvGrpSpPr>
@@ -3316,532 +3372,844 @@
               <a:xfrm>
                 <a:off x="1677229" y="1272675"/>
                 <a:ext cx="8953524" cy="4347000"/>
-                <a:chOff x="1137583" y="13500"/>
+                <a:chOff x="1677229" y="1272675"/>
                 <a:chExt cx="8953524" cy="4347000"/>
               </a:xfrm>
+              <a:grpFill/>
             </p:grpSpPr>
-            <p:pic>
-              <p:nvPicPr>
-                <p:cNvPr id="11" name="図 10"/>
-                <p:cNvPicPr>
-                  <a:picLocks noChangeAspect="1"/>
-                </p:cNvPicPr>
+            <p:grpSp>
+              <p:nvGrpSpPr>
+                <p:cNvPr id="41" name="図形グループ 40"/>
+                <p:cNvGrpSpPr/>
                 <p:nvPr/>
-              </p:nvPicPr>
-              <p:blipFill rotWithShape="1">
-                <a:blip r:embed="rId2">
-                  <a:extLst>
-                    <a:ext uri="{28A0092B-C50C-407E-A947-70E740481C1C}">
-                      <a14:useLocalDpi xmlns:a14="http://schemas.microsoft.com/office/drawing/2010/main" val="0"/>
-                    </a:ext>
-                  </a:extLst>
-                </a:blip>
-                <a:srcRect l="14262" t="9922" r="11889" b="10381"/>
-                <a:stretch/>
-              </p:blipFill>
+              </p:nvGrpSpPr>
+              <p:grpSpPr>
+                <a:xfrm>
+                  <a:off x="1677229" y="1272675"/>
+                  <a:ext cx="8953524" cy="4347000"/>
+                  <a:chOff x="1677229" y="1272675"/>
+                  <a:chExt cx="8953524" cy="4347000"/>
+                </a:xfrm>
+                <a:grpFill/>
+              </p:grpSpPr>
+              <p:grpSp>
+                <p:nvGrpSpPr>
+                  <p:cNvPr id="36" name="図形グループ 35"/>
+                  <p:cNvGrpSpPr/>
+                  <p:nvPr/>
+                </p:nvGrpSpPr>
+                <p:grpSpPr>
+                  <a:xfrm>
+                    <a:off x="1677229" y="1272675"/>
+                    <a:ext cx="8953524" cy="4347000"/>
+                    <a:chOff x="1137583" y="13500"/>
+                    <a:chExt cx="8953524" cy="4347000"/>
+                  </a:xfrm>
+                  <a:grpFill/>
+                </p:grpSpPr>
+                <p:pic>
+                  <p:nvPicPr>
+                    <p:cNvPr id="11" name="図 10"/>
+                    <p:cNvPicPr>
+                      <a:picLocks noChangeAspect="1"/>
+                    </p:cNvPicPr>
+                    <p:nvPr/>
+                  </p:nvPicPr>
+                  <p:blipFill rotWithShape="1">
+                    <a:blip r:embed="rId2">
+                      <a:extLst>
+                        <a:ext uri="{28A0092B-C50C-407E-A947-70E740481C1C}">
+                          <a14:useLocalDpi xmlns:a14="http://schemas.microsoft.com/office/drawing/2010/main" val="0"/>
+                        </a:ext>
+                      </a:extLst>
+                    </a:blip>
+                    <a:srcRect l="15238" t="9922" r="13316" b="10381"/>
+                    <a:stretch/>
+                  </p:blipFill>
+                  <p:spPr>
+                    <a:xfrm>
+                      <a:off x="4149830" y="469127"/>
+                      <a:ext cx="2736850" cy="3442916"/>
+                    </a:xfrm>
+                    <a:prstGeom prst="rect">
+                      <a:avLst/>
+                    </a:prstGeom>
+                    <a:grpFill/>
+                  </p:spPr>
+                </p:pic>
+                <p:pic>
+                  <p:nvPicPr>
+                    <p:cNvPr id="4" name="図 3"/>
+                    <p:cNvPicPr>
+                      <a:picLocks noChangeAspect="1"/>
+                    </p:cNvPicPr>
+                    <p:nvPr/>
+                  </p:nvPicPr>
+                  <p:blipFill>
+                    <a:blip r:embed="rId3">
+                      <a:extLst>
+                        <a:ext uri="{28A0092B-C50C-407E-A947-70E740481C1C}">
+                          <a14:useLocalDpi xmlns:a14="http://schemas.microsoft.com/office/drawing/2010/main" val="0"/>
+                        </a:ext>
+                      </a:extLst>
+                    </a:blip>
+                    <a:stretch>
+                      <a:fillRect/>
+                    </a:stretch>
+                  </p:blipFill>
+                  <p:spPr>
+                    <a:xfrm>
+                      <a:off x="8341074" y="13500"/>
+                      <a:ext cx="1345794" cy="1080000"/>
+                    </a:xfrm>
+                    <a:prstGeom prst="rect">
+                      <a:avLst/>
+                    </a:prstGeom>
+                    <a:grpFill/>
+                  </p:spPr>
+                </p:pic>
+                <p:pic>
+                  <p:nvPicPr>
+                    <p:cNvPr id="5" name="図 4"/>
+                    <p:cNvPicPr>
+                      <a:picLocks noChangeAspect="1"/>
+                    </p:cNvPicPr>
+                    <p:nvPr/>
+                  </p:nvPicPr>
+                  <p:blipFill>
+                    <a:blip r:embed="rId4">
+                      <a:extLst>
+                        <a:ext uri="{28A0092B-C50C-407E-A947-70E740481C1C}">
+                          <a14:useLocalDpi xmlns:a14="http://schemas.microsoft.com/office/drawing/2010/main" val="0"/>
+                        </a:ext>
+                      </a:extLst>
+                    </a:blip>
+                    <a:stretch>
+                      <a:fillRect/>
+                    </a:stretch>
+                  </p:blipFill>
+                  <p:spPr>
+                    <a:xfrm>
+                      <a:off x="7936836" y="2187000"/>
+                      <a:ext cx="2154271" cy="1080000"/>
+                    </a:xfrm>
+                    <a:prstGeom prst="rect">
+                      <a:avLst/>
+                    </a:prstGeom>
+                    <a:grpFill/>
+                  </p:spPr>
+                </p:pic>
+                <p:pic>
+                  <p:nvPicPr>
+                    <p:cNvPr id="6" name="図 5"/>
+                    <p:cNvPicPr>
+                      <a:picLocks noChangeAspect="1"/>
+                    </p:cNvPicPr>
+                    <p:nvPr/>
+                  </p:nvPicPr>
+                  <p:blipFill>
+                    <a:blip r:embed="rId3">
+                      <a:extLst>
+                        <a:ext uri="{28A0092B-C50C-407E-A947-70E740481C1C}">
+                          <a14:useLocalDpi xmlns:a14="http://schemas.microsoft.com/office/drawing/2010/main" val="0"/>
+                        </a:ext>
+                      </a:extLst>
+                    </a:blip>
+                    <a:stretch>
+                      <a:fillRect/>
+                    </a:stretch>
+                  </p:blipFill>
+                  <p:spPr>
+                    <a:xfrm>
+                      <a:off x="8341075" y="1093500"/>
+                      <a:ext cx="1345794" cy="1080000"/>
+                    </a:xfrm>
+                    <a:prstGeom prst="rect">
+                      <a:avLst/>
+                    </a:prstGeom>
+                    <a:grpFill/>
+                  </p:spPr>
+                </p:pic>
+                <p:pic>
+                  <p:nvPicPr>
+                    <p:cNvPr id="8" name="図 7"/>
+                    <p:cNvPicPr>
+                      <a:picLocks noChangeAspect="1"/>
+                    </p:cNvPicPr>
+                    <p:nvPr/>
+                  </p:nvPicPr>
+                  <p:blipFill>
+                    <a:blip r:embed="rId5">
+                      <a:extLst>
+                        <a:ext uri="{28A0092B-C50C-407E-A947-70E740481C1C}">
+                          <a14:useLocalDpi xmlns:a14="http://schemas.microsoft.com/office/drawing/2010/main" val="0"/>
+                        </a:ext>
+                      </a:extLst>
+                    </a:blip>
+                    <a:stretch>
+                      <a:fillRect/>
+                    </a:stretch>
+                  </p:blipFill>
+                  <p:spPr>
+                    <a:xfrm>
+                      <a:off x="1228393" y="27000"/>
+                      <a:ext cx="1706906" cy="1440000"/>
+                    </a:xfrm>
+                    <a:prstGeom prst="rect">
+                      <a:avLst/>
+                    </a:prstGeom>
+                    <a:grpFill/>
+                  </p:spPr>
+                </p:pic>
+                <p:pic>
+                  <p:nvPicPr>
+                    <p:cNvPr id="9" name="図 8"/>
+                    <p:cNvPicPr>
+                      <a:picLocks noChangeAspect="1"/>
+                    </p:cNvPicPr>
+                    <p:nvPr/>
+                  </p:nvPicPr>
+                  <p:blipFill>
+                    <a:blip r:embed="rId6">
+                      <a:extLst>
+                        <a:ext uri="{28A0092B-C50C-407E-A947-70E740481C1C}">
+                          <a14:useLocalDpi xmlns:a14="http://schemas.microsoft.com/office/drawing/2010/main" val="0"/>
+                        </a:ext>
+                      </a:extLst>
+                    </a:blip>
+                    <a:stretch>
+                      <a:fillRect/>
+                    </a:stretch>
+                  </p:blipFill>
+                  <p:spPr>
+                    <a:xfrm>
+                      <a:off x="1137583" y="1467000"/>
+                      <a:ext cx="1888525" cy="1440000"/>
+                    </a:xfrm>
+                    <a:prstGeom prst="rect">
+                      <a:avLst/>
+                    </a:prstGeom>
+                    <a:grpFill/>
+                  </p:spPr>
+                </p:pic>
+                <p:pic>
+                  <p:nvPicPr>
+                    <p:cNvPr id="10" name="図 9"/>
+                    <p:cNvPicPr>
+                      <a:picLocks noChangeAspect="1"/>
+                    </p:cNvPicPr>
+                    <p:nvPr/>
+                  </p:nvPicPr>
+                  <p:blipFill>
+                    <a:blip r:embed="rId7">
+                      <a:extLst>
+                        <a:ext uri="{28A0092B-C50C-407E-A947-70E740481C1C}">
+                          <a14:useLocalDpi xmlns:a14="http://schemas.microsoft.com/office/drawing/2010/main" val="0"/>
+                        </a:ext>
+                      </a:extLst>
+                    </a:blip>
+                    <a:stretch>
+                      <a:fillRect/>
+                    </a:stretch>
+                  </p:blipFill>
+                  <p:spPr>
+                    <a:xfrm>
+                      <a:off x="1361845" y="2920500"/>
+                      <a:ext cx="1440000" cy="1440000"/>
+                    </a:xfrm>
+                    <a:prstGeom prst="rect">
+                      <a:avLst/>
+                    </a:prstGeom>
+                    <a:grpFill/>
+                  </p:spPr>
+                </p:pic>
+                <p:cxnSp>
+                  <p:nvCxnSpPr>
+                    <p:cNvPr id="13" name="直線矢印コネクタ 12"/>
+                    <p:cNvCxnSpPr>
+                      <a:stCxn id="8" idx="3"/>
+                    </p:cNvCxnSpPr>
+                    <p:nvPr/>
+                  </p:nvCxnSpPr>
+                  <p:spPr>
+                    <a:xfrm>
+                      <a:off x="2935299" y="747000"/>
+                      <a:ext cx="1247085" cy="587125"/>
+                    </a:xfrm>
+                    <a:prstGeom prst="straightConnector1">
+                      <a:avLst/>
+                    </a:prstGeom>
+                    <a:grpFill/>
+                    <a:ln w="127000" cmpd="sng">
+                      <a:solidFill>
+                        <a:schemeClr val="tx1"/>
+                      </a:solidFill>
+                      <a:tailEnd type="triangle"/>
+                    </a:ln>
+                  </p:spPr>
+                  <p:style>
+                    <a:lnRef idx="1">
+                      <a:schemeClr val="accent1"/>
+                    </a:lnRef>
+                    <a:fillRef idx="0">
+                      <a:schemeClr val="accent1"/>
+                    </a:fillRef>
+                    <a:effectRef idx="0">
+                      <a:schemeClr val="accent1"/>
+                    </a:effectRef>
+                    <a:fontRef idx="minor">
+                      <a:schemeClr val="tx1"/>
+                    </a:fontRef>
+                  </p:style>
+                </p:cxnSp>
+                <p:cxnSp>
+                  <p:nvCxnSpPr>
+                    <p:cNvPr id="15" name="直線矢印コネクタ 14"/>
+                    <p:cNvCxnSpPr>
+                      <a:stCxn id="9" idx="3"/>
+                      <a:endCxn id="11" idx="1"/>
+                    </p:cNvCxnSpPr>
+                    <p:nvPr/>
+                  </p:nvCxnSpPr>
+                  <p:spPr>
+                    <a:xfrm>
+                      <a:off x="3026108" y="2187000"/>
+                      <a:ext cx="1123722" cy="3585"/>
+                    </a:xfrm>
+                    <a:prstGeom prst="straightConnector1">
+                      <a:avLst/>
+                    </a:prstGeom>
+                    <a:grpFill/>
+                    <a:ln w="127000">
+                      <a:solidFill>
+                        <a:schemeClr val="tx1"/>
+                      </a:solidFill>
+                      <a:tailEnd type="triangle"/>
+                    </a:ln>
+                  </p:spPr>
+                  <p:style>
+                    <a:lnRef idx="1">
+                      <a:schemeClr val="accent1"/>
+                    </a:lnRef>
+                    <a:fillRef idx="0">
+                      <a:schemeClr val="accent1"/>
+                    </a:fillRef>
+                    <a:effectRef idx="0">
+                      <a:schemeClr val="accent1"/>
+                    </a:effectRef>
+                    <a:fontRef idx="minor">
+                      <a:schemeClr val="tx1"/>
+                    </a:fontRef>
+                  </p:style>
+                </p:cxnSp>
+                <p:cxnSp>
+                  <p:nvCxnSpPr>
+                    <p:cNvPr id="18" name="直線矢印コネクタ 17"/>
+                    <p:cNvCxnSpPr>
+                      <a:stCxn id="10" idx="3"/>
+                    </p:cNvCxnSpPr>
+                    <p:nvPr/>
+                  </p:nvCxnSpPr>
+                  <p:spPr>
+                    <a:xfrm flipV="1">
+                      <a:off x="2801845" y="3053375"/>
+                      <a:ext cx="1380539" cy="587125"/>
+                    </a:xfrm>
+                    <a:prstGeom prst="straightConnector1">
+                      <a:avLst/>
+                    </a:prstGeom>
+                    <a:grpFill/>
+                    <a:ln w="127000">
+                      <a:solidFill>
+                        <a:schemeClr val="tx1"/>
+                      </a:solidFill>
+                      <a:tailEnd type="triangle"/>
+                    </a:ln>
+                  </p:spPr>
+                  <p:style>
+                    <a:lnRef idx="1">
+                      <a:schemeClr val="accent1"/>
+                    </a:lnRef>
+                    <a:fillRef idx="0">
+                      <a:schemeClr val="accent1"/>
+                    </a:fillRef>
+                    <a:effectRef idx="0">
+                      <a:schemeClr val="accent1"/>
+                    </a:effectRef>
+                    <a:fontRef idx="minor">
+                      <a:schemeClr val="tx1"/>
+                    </a:fontRef>
+                  </p:style>
+                </p:cxnSp>
+                <p:cxnSp>
+                  <p:nvCxnSpPr>
+                    <p:cNvPr id="21" name="直線矢印コネクタ 20"/>
+                    <p:cNvCxnSpPr>
+                      <a:stCxn id="4" idx="1"/>
+                    </p:cNvCxnSpPr>
+                    <p:nvPr/>
+                  </p:nvCxnSpPr>
+                  <p:spPr>
+                    <a:xfrm flipH="1">
+                      <a:off x="6850505" y="553500"/>
+                      <a:ext cx="1490569" cy="780625"/>
+                    </a:xfrm>
+                    <a:prstGeom prst="straightConnector1">
+                      <a:avLst/>
+                    </a:prstGeom>
+                    <a:grpFill/>
+                    <a:ln w="127000">
+                      <a:solidFill>
+                        <a:schemeClr val="tx1"/>
+                      </a:solidFill>
+                      <a:tailEnd type="triangle"/>
+                    </a:ln>
+                  </p:spPr>
+                  <p:style>
+                    <a:lnRef idx="1">
+                      <a:schemeClr val="accent1"/>
+                    </a:lnRef>
+                    <a:fillRef idx="0">
+                      <a:schemeClr val="accent1"/>
+                    </a:fillRef>
+                    <a:effectRef idx="0">
+                      <a:schemeClr val="accent1"/>
+                    </a:effectRef>
+                    <a:fontRef idx="minor">
+                      <a:schemeClr val="tx1"/>
+                    </a:fontRef>
+                  </p:style>
+                </p:cxnSp>
+                <p:cxnSp>
+                  <p:nvCxnSpPr>
+                    <p:cNvPr id="24" name="直線矢印コネクタ 23"/>
+                    <p:cNvCxnSpPr>
+                      <a:stCxn id="6" idx="1"/>
+                    </p:cNvCxnSpPr>
+                    <p:nvPr/>
+                  </p:nvCxnSpPr>
+                  <p:spPr>
+                    <a:xfrm flipH="1">
+                      <a:off x="6850505" y="1633500"/>
+                      <a:ext cx="1490570" cy="312875"/>
+                    </a:xfrm>
+                    <a:prstGeom prst="straightConnector1">
+                      <a:avLst/>
+                    </a:prstGeom>
+                    <a:grpFill/>
+                    <a:ln w="127000">
+                      <a:solidFill>
+                        <a:schemeClr val="tx1"/>
+                      </a:solidFill>
+                      <a:tailEnd type="triangle"/>
+                    </a:ln>
+                  </p:spPr>
+                  <p:style>
+                    <a:lnRef idx="1">
+                      <a:schemeClr val="accent1"/>
+                    </a:lnRef>
+                    <a:fillRef idx="0">
+                      <a:schemeClr val="accent1"/>
+                    </a:fillRef>
+                    <a:effectRef idx="0">
+                      <a:schemeClr val="accent1"/>
+                    </a:effectRef>
+                    <a:fontRef idx="minor">
+                      <a:schemeClr val="tx1"/>
+                    </a:fontRef>
+                  </p:style>
+                </p:cxnSp>
+                <p:cxnSp>
+                  <p:nvCxnSpPr>
+                    <p:cNvPr id="27" name="直線矢印コネクタ 26"/>
+                    <p:cNvCxnSpPr>
+                      <a:stCxn id="5" idx="1"/>
+                    </p:cNvCxnSpPr>
+                    <p:nvPr/>
+                  </p:nvCxnSpPr>
+                  <p:spPr>
+                    <a:xfrm flipH="1" flipV="1">
+                      <a:off x="6850505" y="2427625"/>
+                      <a:ext cx="1086331" cy="299375"/>
+                    </a:xfrm>
+                    <a:prstGeom prst="straightConnector1">
+                      <a:avLst/>
+                    </a:prstGeom>
+                    <a:grpFill/>
+                    <a:ln w="127000">
+                      <a:solidFill>
+                        <a:schemeClr val="tx1"/>
+                      </a:solidFill>
+                      <a:tailEnd type="triangle"/>
+                    </a:ln>
+                  </p:spPr>
+                  <p:style>
+                    <a:lnRef idx="1">
+                      <a:schemeClr val="accent1"/>
+                    </a:lnRef>
+                    <a:fillRef idx="0">
+                      <a:schemeClr val="accent1"/>
+                    </a:fillRef>
+                    <a:effectRef idx="0">
+                      <a:schemeClr val="accent1"/>
+                    </a:effectRef>
+                    <a:fontRef idx="minor">
+                      <a:schemeClr val="tx1"/>
+                    </a:fontRef>
+                  </p:style>
+                </p:cxnSp>
+                <p:cxnSp>
+                  <p:nvCxnSpPr>
+                    <p:cNvPr id="30" name="直線矢印コネクタ 29"/>
+                    <p:cNvCxnSpPr/>
+                    <p:nvPr/>
+                  </p:nvCxnSpPr>
+                  <p:spPr>
+                    <a:xfrm flipH="1" flipV="1">
+                      <a:off x="6850505" y="3053375"/>
+                      <a:ext cx="1086331" cy="767125"/>
+                    </a:xfrm>
+                    <a:prstGeom prst="straightConnector1">
+                      <a:avLst/>
+                    </a:prstGeom>
+                    <a:grpFill/>
+                    <a:ln w="127000">
+                      <a:solidFill>
+                        <a:schemeClr val="tx1"/>
+                      </a:solidFill>
+                      <a:tailEnd type="triangle"/>
+                    </a:ln>
+                  </p:spPr>
+                  <p:style>
+                    <a:lnRef idx="1">
+                      <a:schemeClr val="accent1"/>
+                    </a:lnRef>
+                    <a:fillRef idx="0">
+                      <a:schemeClr val="accent1"/>
+                    </a:fillRef>
+                    <a:effectRef idx="0">
+                      <a:schemeClr val="accent1"/>
+                    </a:effectRef>
+                    <a:fontRef idx="minor">
+                      <a:schemeClr val="tx1"/>
+                    </a:fontRef>
+                  </p:style>
+                </p:cxnSp>
+              </p:grpSp>
+              <p:sp>
+                <p:nvSpPr>
+                  <p:cNvPr id="37" name="テキスト ボックス 36"/>
+                  <p:cNvSpPr txBox="1"/>
+                  <p:nvPr/>
+                </p:nvSpPr>
+                <p:spPr>
+                  <a:xfrm>
+                    <a:off x="8880720" y="2510753"/>
+                    <a:ext cx="1345794" cy="523220"/>
+                  </a:xfrm>
+                  <a:prstGeom prst="rect">
+                    <a:avLst/>
+                  </a:prstGeom>
+                  <a:grpFill/>
+                </p:spPr>
+                <p:txBody>
+                  <a:bodyPr wrap="square" rtlCol="0">
+                    <a:spAutoFit/>
+                  </a:bodyPr>
+                  <a:lstStyle/>
+                  <a:p>
+                    <a:pPr algn="ctr"/>
+                    <a:r>
+                      <a:rPr kumimoji="1" lang="en-US" altLang="ja-JP" sz="2800" b="1" dirty="0" smtClean="0">
+                        <a:solidFill>
+                          <a:schemeClr val="bg1">
+                            <a:lumMod val="95000"/>
+                          </a:schemeClr>
+                        </a:solidFill>
+                        <a:latin typeface="Yu Gothic" charset="-128"/>
+                        <a:ea typeface="Yu Gothic" charset="-128"/>
+                        <a:cs typeface="Yu Gothic" charset="-128"/>
+                      </a:rPr>
+                      <a:t>Mac</a:t>
+                    </a:r>
+                    <a:endParaRPr kumimoji="1" lang="ja-JP" altLang="en-US" b="1" dirty="0">
+                      <a:solidFill>
+                        <a:schemeClr val="bg1">
+                          <a:lumMod val="95000"/>
+                        </a:schemeClr>
+                      </a:solidFill>
+                      <a:latin typeface="Yu Gothic" charset="-128"/>
+                      <a:ea typeface="Yu Gothic" charset="-128"/>
+                      <a:cs typeface="Yu Gothic" charset="-128"/>
+                    </a:endParaRPr>
+                  </a:p>
+                </p:txBody>
+              </p:sp>
+              <p:sp>
+                <p:nvSpPr>
+                  <p:cNvPr id="38" name="テキスト ボックス 37"/>
+                  <p:cNvSpPr txBox="1"/>
+                  <p:nvPr/>
+                </p:nvSpPr>
+                <p:spPr>
+                  <a:xfrm>
+                    <a:off x="8875174" y="1445063"/>
+                    <a:ext cx="1345794" cy="523220"/>
+                  </a:xfrm>
+                  <a:prstGeom prst="rect">
+                    <a:avLst/>
+                  </a:prstGeom>
+                  <a:grpFill/>
+                </p:spPr>
+                <p:txBody>
+                  <a:bodyPr wrap="square" rtlCol="0">
+                    <a:spAutoFit/>
+                  </a:bodyPr>
+                  <a:lstStyle/>
+                  <a:p>
+                    <a:pPr algn="ctr"/>
+                    <a:r>
+                      <a:rPr kumimoji="1" lang="en-US" altLang="ja-JP" sz="2800" b="1" dirty="0" smtClean="0">
+                        <a:solidFill>
+                          <a:schemeClr val="bg1">
+                            <a:lumMod val="95000"/>
+                          </a:schemeClr>
+                        </a:solidFill>
+                        <a:latin typeface="Yu Gothic" charset="-128"/>
+                        <a:ea typeface="Yu Gothic" charset="-128"/>
+                        <a:cs typeface="Yu Gothic" charset="-128"/>
+                      </a:rPr>
+                      <a:t>PC</a:t>
+                    </a:r>
+                    <a:endParaRPr kumimoji="1" lang="ja-JP" altLang="en-US" b="1" dirty="0">
+                      <a:solidFill>
+                        <a:schemeClr val="bg1">
+                          <a:lumMod val="95000"/>
+                        </a:schemeClr>
+                      </a:solidFill>
+                      <a:latin typeface="Yu Gothic" charset="-128"/>
+                      <a:ea typeface="Yu Gothic" charset="-128"/>
+                      <a:cs typeface="Yu Gothic" charset="-128"/>
+                    </a:endParaRPr>
+                  </a:p>
+                </p:txBody>
+              </p:sp>
+              <p:sp>
+                <p:nvSpPr>
+                  <p:cNvPr id="39" name="テキスト ボックス 38"/>
+                  <p:cNvSpPr txBox="1"/>
+                  <p:nvPr/>
+                </p:nvSpPr>
+                <p:spPr>
+                  <a:xfrm>
+                    <a:off x="8319740" y="3453727"/>
+                    <a:ext cx="1945069" cy="954107"/>
+                  </a:xfrm>
+                  <a:prstGeom prst="rect">
+                    <a:avLst/>
+                  </a:prstGeom>
+                  <a:grpFill/>
+                </p:spPr>
+                <p:txBody>
+                  <a:bodyPr wrap="square" rtlCol="0">
+                    <a:spAutoFit/>
+                  </a:bodyPr>
+                  <a:lstStyle/>
+                  <a:p>
+                    <a:pPr algn="ctr"/>
+                    <a:r>
+                      <a:rPr lang="ja-JP" altLang="en-US" sz="2800" b="1" dirty="0" smtClean="0">
+                        <a:solidFill>
+                          <a:schemeClr val="bg1">
+                            <a:lumMod val="95000"/>
+                          </a:schemeClr>
+                        </a:solidFill>
+                        <a:latin typeface="Yu Gothic" charset="-128"/>
+                        <a:ea typeface="Yu Gothic" charset="-128"/>
+                        <a:cs typeface="Yu Gothic" charset="-128"/>
+                      </a:rPr>
+                      <a:t>一部</a:t>
+                    </a:r>
+                    <a:r>
+                      <a:rPr kumimoji="1" lang="en-US" altLang="ja-JP" sz="2800" b="1" dirty="0" smtClean="0">
+                        <a:solidFill>
+                          <a:schemeClr val="bg1">
+                            <a:lumMod val="95000"/>
+                          </a:schemeClr>
+                        </a:solidFill>
+                        <a:latin typeface="Yu Gothic" charset="-128"/>
+                        <a:ea typeface="Yu Gothic" charset="-128"/>
+                        <a:cs typeface="Yu Gothic" charset="-128"/>
+                      </a:rPr>
+                      <a:t/>
+                    </a:r>
+                    <a:br>
+                      <a:rPr kumimoji="1" lang="en-US" altLang="ja-JP" sz="2800" b="1" dirty="0" smtClean="0">
+                        <a:solidFill>
+                          <a:schemeClr val="bg1">
+                            <a:lumMod val="95000"/>
+                          </a:schemeClr>
+                        </a:solidFill>
+                        <a:latin typeface="Yu Gothic" charset="-128"/>
+                        <a:ea typeface="Yu Gothic" charset="-128"/>
+                        <a:cs typeface="Yu Gothic" charset="-128"/>
+                      </a:rPr>
+                    </a:br>
+                    <a:r>
+                      <a:rPr kumimoji="1" lang="ja-JP" altLang="en-US" sz="2800" b="1" dirty="0" smtClean="0">
+                        <a:solidFill>
+                          <a:schemeClr val="bg1">
+                            <a:lumMod val="95000"/>
+                          </a:schemeClr>
+                        </a:solidFill>
+                        <a:latin typeface="Yu Gothic" charset="-128"/>
+                        <a:ea typeface="Yu Gothic" charset="-128"/>
+                        <a:cs typeface="Yu Gothic" charset="-128"/>
+                      </a:rPr>
+                      <a:t>ゲーム機</a:t>
+                    </a:r>
+                    <a:endParaRPr kumimoji="1" lang="ja-JP" altLang="en-US" sz="2800" b="1" dirty="0">
+                      <a:solidFill>
+                        <a:schemeClr val="bg1">
+                          <a:lumMod val="95000"/>
+                        </a:schemeClr>
+                      </a:solidFill>
+                      <a:latin typeface="Yu Gothic" charset="-128"/>
+                      <a:ea typeface="Yu Gothic" charset="-128"/>
+                      <a:cs typeface="Yu Gothic" charset="-128"/>
+                    </a:endParaRPr>
+                  </a:p>
+                </p:txBody>
+              </p:sp>
+            </p:grpSp>
+            <p:sp>
+              <p:nvSpPr>
+                <p:cNvPr id="52" name="テキスト ボックス 51"/>
+                <p:cNvSpPr txBox="1"/>
+                <p:nvPr/>
+              </p:nvSpPr>
               <p:spPr>
                 <a:xfrm>
-                  <a:off x="4112439" y="469127"/>
-                  <a:ext cx="2828875" cy="3442916"/>
+                  <a:off x="4695022" y="1728302"/>
+                  <a:ext cx="2727683" cy="3442916"/>
                 </a:xfrm>
                 <a:prstGeom prst="rect">
                   <a:avLst/>
                 </a:prstGeom>
+                <a:grpFill/>
               </p:spPr>
-            </p:pic>
-            <p:pic>
-              <p:nvPicPr>
-                <p:cNvPr id="4" name="図 3"/>
-                <p:cNvPicPr>
-                  <a:picLocks noChangeAspect="1"/>
-                </p:cNvPicPr>
-                <p:nvPr/>
-              </p:nvPicPr>
-              <p:blipFill>
-                <a:blip r:embed="rId3">
-                  <a:extLst>
-                    <a:ext uri="{28A0092B-C50C-407E-A947-70E740481C1C}">
-                      <a14:useLocalDpi xmlns:a14="http://schemas.microsoft.com/office/drawing/2010/main" val="0"/>
-                    </a:ext>
-                  </a:extLst>
-                </a:blip>
-                <a:stretch>
-                  <a:fillRect/>
-                </a:stretch>
-              </p:blipFill>
-              <p:spPr>
-                <a:xfrm>
-                  <a:off x="8341074" y="13500"/>
-                  <a:ext cx="1345794" cy="1080000"/>
-                </a:xfrm>
-                <a:prstGeom prst="rect">
-                  <a:avLst/>
-                </a:prstGeom>
-              </p:spPr>
-            </p:pic>
-            <p:pic>
-              <p:nvPicPr>
-                <p:cNvPr id="5" name="図 4"/>
-                <p:cNvPicPr>
-                  <a:picLocks noChangeAspect="1"/>
-                </p:cNvPicPr>
-                <p:nvPr/>
-              </p:nvPicPr>
-              <p:blipFill>
-                <a:blip r:embed="rId4">
-                  <a:extLst>
-                    <a:ext uri="{28A0092B-C50C-407E-A947-70E740481C1C}">
-                      <a14:useLocalDpi xmlns:a14="http://schemas.microsoft.com/office/drawing/2010/main" val="0"/>
-                    </a:ext>
-                  </a:extLst>
-                </a:blip>
-                <a:stretch>
-                  <a:fillRect/>
-                </a:stretch>
-              </p:blipFill>
-              <p:spPr>
-                <a:xfrm>
-                  <a:off x="7936836" y="2187000"/>
-                  <a:ext cx="2154271" cy="1080000"/>
-                </a:xfrm>
-                <a:prstGeom prst="rect">
-                  <a:avLst/>
-                </a:prstGeom>
-              </p:spPr>
-            </p:pic>
-            <p:pic>
-              <p:nvPicPr>
-                <p:cNvPr id="6" name="図 5"/>
-                <p:cNvPicPr>
-                  <a:picLocks noChangeAspect="1"/>
-                </p:cNvPicPr>
-                <p:nvPr/>
-              </p:nvPicPr>
-              <p:blipFill>
-                <a:blip r:embed="rId3">
-                  <a:extLst>
-                    <a:ext uri="{28A0092B-C50C-407E-A947-70E740481C1C}">
-                      <a14:useLocalDpi xmlns:a14="http://schemas.microsoft.com/office/drawing/2010/main" val="0"/>
-                    </a:ext>
-                  </a:extLst>
-                </a:blip>
-                <a:stretch>
-                  <a:fillRect/>
-                </a:stretch>
-              </p:blipFill>
-              <p:spPr>
-                <a:xfrm>
-                  <a:off x="8341075" y="1093500"/>
-                  <a:ext cx="1345794" cy="1080000"/>
-                </a:xfrm>
-                <a:prstGeom prst="rect">
-                  <a:avLst/>
-                </a:prstGeom>
-              </p:spPr>
-            </p:pic>
-            <p:pic>
-              <p:nvPicPr>
-                <p:cNvPr id="7" name="図 6"/>
-                <p:cNvPicPr>
-                  <a:picLocks noChangeAspect="1"/>
-                </p:cNvPicPr>
-                <p:nvPr/>
-              </p:nvPicPr>
-              <p:blipFill>
-                <a:blip r:embed="rId4">
-                  <a:extLst>
-                    <a:ext uri="{28A0092B-C50C-407E-A947-70E740481C1C}">
-                      <a14:useLocalDpi xmlns:a14="http://schemas.microsoft.com/office/drawing/2010/main" val="0"/>
-                    </a:ext>
-                  </a:extLst>
-                </a:blip>
-                <a:stretch>
-                  <a:fillRect/>
-                </a:stretch>
-              </p:blipFill>
-              <p:spPr>
-                <a:xfrm>
-                  <a:off x="7936836" y="3280500"/>
-                  <a:ext cx="2154271" cy="1080000"/>
-                </a:xfrm>
-                <a:prstGeom prst="rect">
-                  <a:avLst/>
-                </a:prstGeom>
-              </p:spPr>
-            </p:pic>
-            <p:pic>
-              <p:nvPicPr>
-                <p:cNvPr id="8" name="図 7"/>
-                <p:cNvPicPr>
-                  <a:picLocks noChangeAspect="1"/>
-                </p:cNvPicPr>
-                <p:nvPr/>
-              </p:nvPicPr>
-              <p:blipFill>
-                <a:blip r:embed="rId5">
-                  <a:extLst>
-                    <a:ext uri="{28A0092B-C50C-407E-A947-70E740481C1C}">
-                      <a14:useLocalDpi xmlns:a14="http://schemas.microsoft.com/office/drawing/2010/main" val="0"/>
-                    </a:ext>
-                  </a:extLst>
-                </a:blip>
-                <a:stretch>
-                  <a:fillRect/>
-                </a:stretch>
-              </p:blipFill>
-              <p:spPr>
-                <a:xfrm>
-                  <a:off x="1228393" y="27000"/>
-                  <a:ext cx="1706906" cy="1440000"/>
-                </a:xfrm>
-                <a:prstGeom prst="rect">
-                  <a:avLst/>
-                </a:prstGeom>
-              </p:spPr>
-            </p:pic>
-            <p:pic>
-              <p:nvPicPr>
-                <p:cNvPr id="9" name="図 8"/>
-                <p:cNvPicPr>
-                  <a:picLocks noChangeAspect="1"/>
-                </p:cNvPicPr>
-                <p:nvPr/>
-              </p:nvPicPr>
-              <p:blipFill>
-                <a:blip r:embed="rId6">
-                  <a:extLst>
-                    <a:ext uri="{28A0092B-C50C-407E-A947-70E740481C1C}">
-                      <a14:useLocalDpi xmlns:a14="http://schemas.microsoft.com/office/drawing/2010/main" val="0"/>
-                    </a:ext>
-                  </a:extLst>
-                </a:blip>
-                <a:stretch>
-                  <a:fillRect/>
-                </a:stretch>
-              </p:blipFill>
-              <p:spPr>
-                <a:xfrm>
-                  <a:off x="1137583" y="1467000"/>
-                  <a:ext cx="1888525" cy="1440000"/>
-                </a:xfrm>
-                <a:prstGeom prst="rect">
-                  <a:avLst/>
-                </a:prstGeom>
-              </p:spPr>
-            </p:pic>
-            <p:pic>
-              <p:nvPicPr>
-                <p:cNvPr id="10" name="図 9"/>
-                <p:cNvPicPr>
-                  <a:picLocks noChangeAspect="1"/>
-                </p:cNvPicPr>
-                <p:nvPr/>
-              </p:nvPicPr>
-              <p:blipFill>
-                <a:blip r:embed="rId7">
-                  <a:extLst>
-                    <a:ext uri="{28A0092B-C50C-407E-A947-70E740481C1C}">
-                      <a14:useLocalDpi xmlns:a14="http://schemas.microsoft.com/office/drawing/2010/main" val="0"/>
-                    </a:ext>
-                  </a:extLst>
-                </a:blip>
-                <a:stretch>
-                  <a:fillRect/>
-                </a:stretch>
-              </p:blipFill>
-              <p:spPr>
-                <a:xfrm>
-                  <a:off x="1361845" y="2920500"/>
-                  <a:ext cx="1440000" cy="1440000"/>
-                </a:xfrm>
-                <a:prstGeom prst="rect">
-                  <a:avLst/>
-                </a:prstGeom>
-              </p:spPr>
-            </p:pic>
-            <p:cxnSp>
-              <p:nvCxnSpPr>
-                <p:cNvPr id="13" name="直線矢印コネクタ 12"/>
-                <p:cNvCxnSpPr>
-                  <a:stCxn id="8" idx="3"/>
-                </p:cNvCxnSpPr>
-                <p:nvPr/>
-              </p:nvCxnSpPr>
-              <p:spPr>
-                <a:xfrm>
-                  <a:off x="2935299" y="747000"/>
-                  <a:ext cx="1247085" cy="587125"/>
-                </a:xfrm>
-                <a:prstGeom prst="straightConnector1">
-                  <a:avLst/>
-                </a:prstGeom>
-                <a:ln w="127000" cmpd="sng">
-                  <a:solidFill>
-                    <a:schemeClr val="tx1"/>
-                  </a:solidFill>
-                  <a:tailEnd type="triangle"/>
-                </a:ln>
-              </p:spPr>
-              <p:style>
-                <a:lnRef idx="1">
-                  <a:schemeClr val="accent1"/>
-                </a:lnRef>
-                <a:fillRef idx="0">
-                  <a:schemeClr val="accent1"/>
-                </a:fillRef>
-                <a:effectRef idx="0">
-                  <a:schemeClr val="accent1"/>
-                </a:effectRef>
-                <a:fontRef idx="minor">
-                  <a:schemeClr val="tx1"/>
-                </a:fontRef>
-              </p:style>
-            </p:cxnSp>
-            <p:cxnSp>
-              <p:nvCxnSpPr>
-                <p:cNvPr id="15" name="直線矢印コネクタ 14"/>
-                <p:cNvCxnSpPr>
-                  <a:stCxn id="9" idx="3"/>
-                  <a:endCxn id="11" idx="1"/>
-                </p:cNvCxnSpPr>
-                <p:nvPr/>
-              </p:nvCxnSpPr>
-              <p:spPr>
-                <a:xfrm>
-                  <a:off x="3026108" y="2187000"/>
-                  <a:ext cx="1086331" cy="3585"/>
-                </a:xfrm>
-                <a:prstGeom prst="straightConnector1">
-                  <a:avLst/>
-                </a:prstGeom>
-                <a:ln w="127000">
-                  <a:solidFill>
-                    <a:schemeClr val="tx1"/>
-                  </a:solidFill>
-                  <a:tailEnd type="triangle"/>
-                </a:ln>
-              </p:spPr>
-              <p:style>
-                <a:lnRef idx="1">
-                  <a:schemeClr val="accent1"/>
-                </a:lnRef>
-                <a:fillRef idx="0">
-                  <a:schemeClr val="accent1"/>
-                </a:fillRef>
-                <a:effectRef idx="0">
-                  <a:schemeClr val="accent1"/>
-                </a:effectRef>
-                <a:fontRef idx="minor">
-                  <a:schemeClr val="tx1"/>
-                </a:fontRef>
-              </p:style>
-            </p:cxnSp>
-            <p:cxnSp>
-              <p:nvCxnSpPr>
-                <p:cNvPr id="18" name="直線矢印コネクタ 17"/>
-                <p:cNvCxnSpPr>
-                  <a:stCxn id="10" idx="3"/>
-                </p:cNvCxnSpPr>
-                <p:nvPr/>
-              </p:nvCxnSpPr>
-              <p:spPr>
-                <a:xfrm flipV="1">
-                  <a:off x="2801845" y="3053375"/>
-                  <a:ext cx="1380539" cy="587125"/>
-                </a:xfrm>
-                <a:prstGeom prst="straightConnector1">
-                  <a:avLst/>
-                </a:prstGeom>
-                <a:ln w="127000">
-                  <a:solidFill>
-                    <a:schemeClr val="tx1"/>
-                  </a:solidFill>
-                  <a:tailEnd type="triangle"/>
-                </a:ln>
-              </p:spPr>
-              <p:style>
-                <a:lnRef idx="1">
-                  <a:schemeClr val="accent1"/>
-                </a:lnRef>
-                <a:fillRef idx="0">
-                  <a:schemeClr val="accent1"/>
-                </a:fillRef>
-                <a:effectRef idx="0">
-                  <a:schemeClr val="accent1"/>
-                </a:effectRef>
-                <a:fontRef idx="minor">
-                  <a:schemeClr val="tx1"/>
-                </a:fontRef>
-              </p:style>
-            </p:cxnSp>
-            <p:cxnSp>
-              <p:nvCxnSpPr>
-                <p:cNvPr id="21" name="直線矢印コネクタ 20"/>
-                <p:cNvCxnSpPr>
-                  <a:stCxn id="4" idx="1"/>
-                </p:cNvCxnSpPr>
-                <p:nvPr/>
-              </p:nvCxnSpPr>
-              <p:spPr>
-                <a:xfrm flipH="1">
-                  <a:off x="6850505" y="553500"/>
-                  <a:ext cx="1490569" cy="780625"/>
-                </a:xfrm>
-                <a:prstGeom prst="straightConnector1">
-                  <a:avLst/>
-                </a:prstGeom>
-                <a:ln w="127000">
-                  <a:solidFill>
-                    <a:schemeClr val="tx1"/>
-                  </a:solidFill>
-                  <a:tailEnd type="triangle"/>
-                </a:ln>
-              </p:spPr>
-              <p:style>
-                <a:lnRef idx="1">
-                  <a:schemeClr val="accent1"/>
-                </a:lnRef>
-                <a:fillRef idx="0">
-                  <a:schemeClr val="accent1"/>
-                </a:fillRef>
-                <a:effectRef idx="0">
-                  <a:schemeClr val="accent1"/>
-                </a:effectRef>
-                <a:fontRef idx="minor">
-                  <a:schemeClr val="tx1"/>
-                </a:fontRef>
-              </p:style>
-            </p:cxnSp>
-            <p:cxnSp>
-              <p:nvCxnSpPr>
-                <p:cNvPr id="24" name="直線矢印コネクタ 23"/>
-                <p:cNvCxnSpPr>
-                  <a:stCxn id="6" idx="1"/>
-                </p:cNvCxnSpPr>
-                <p:nvPr/>
-              </p:nvCxnSpPr>
-              <p:spPr>
-                <a:xfrm flipH="1">
-                  <a:off x="6850505" y="1633500"/>
-                  <a:ext cx="1490570" cy="312875"/>
-                </a:xfrm>
-                <a:prstGeom prst="straightConnector1">
-                  <a:avLst/>
-                </a:prstGeom>
-                <a:ln w="127000">
-                  <a:solidFill>
-                    <a:schemeClr val="tx1"/>
-                  </a:solidFill>
-                  <a:tailEnd type="triangle"/>
-                </a:ln>
-              </p:spPr>
-              <p:style>
-                <a:lnRef idx="1">
-                  <a:schemeClr val="accent1"/>
-                </a:lnRef>
-                <a:fillRef idx="0">
-                  <a:schemeClr val="accent1"/>
-                </a:fillRef>
-                <a:effectRef idx="0">
-                  <a:schemeClr val="accent1"/>
-                </a:effectRef>
-                <a:fontRef idx="minor">
-                  <a:schemeClr val="tx1"/>
-                </a:fontRef>
-              </p:style>
-            </p:cxnSp>
-            <p:cxnSp>
-              <p:nvCxnSpPr>
-                <p:cNvPr id="27" name="直線矢印コネクタ 26"/>
-                <p:cNvCxnSpPr>
-                  <a:stCxn id="5" idx="1"/>
-                </p:cNvCxnSpPr>
-                <p:nvPr/>
-              </p:nvCxnSpPr>
-              <p:spPr>
-                <a:xfrm flipH="1" flipV="1">
-                  <a:off x="6850505" y="2427625"/>
-                  <a:ext cx="1086331" cy="299375"/>
-                </a:xfrm>
-                <a:prstGeom prst="straightConnector1">
-                  <a:avLst/>
-                </a:prstGeom>
-                <a:ln w="127000">
-                  <a:solidFill>
-                    <a:schemeClr val="tx1"/>
-                  </a:solidFill>
-                  <a:tailEnd type="triangle"/>
-                </a:ln>
-              </p:spPr>
-              <p:style>
-                <a:lnRef idx="1">
-                  <a:schemeClr val="accent1"/>
-                </a:lnRef>
-                <a:fillRef idx="0">
-                  <a:schemeClr val="accent1"/>
-                </a:fillRef>
-                <a:effectRef idx="0">
-                  <a:schemeClr val="accent1"/>
-                </a:effectRef>
-                <a:fontRef idx="minor">
-                  <a:schemeClr val="tx1"/>
-                </a:fontRef>
-              </p:style>
-            </p:cxnSp>
-            <p:cxnSp>
-              <p:nvCxnSpPr>
-                <p:cNvPr id="30" name="直線矢印コネクタ 29"/>
-                <p:cNvCxnSpPr>
-                  <a:stCxn id="7" idx="1"/>
-                </p:cNvCxnSpPr>
-                <p:nvPr/>
-              </p:nvCxnSpPr>
-              <p:spPr>
-                <a:xfrm flipH="1" flipV="1">
-                  <a:off x="6850505" y="3053375"/>
-                  <a:ext cx="1086331" cy="767125"/>
-                </a:xfrm>
-                <a:prstGeom prst="straightConnector1">
-                  <a:avLst/>
-                </a:prstGeom>
-                <a:ln w="127000">
-                  <a:solidFill>
-                    <a:schemeClr val="tx1"/>
-                  </a:solidFill>
-                  <a:tailEnd type="triangle"/>
-                </a:ln>
-              </p:spPr>
-              <p:style>
-                <a:lnRef idx="1">
-                  <a:schemeClr val="accent1"/>
-                </a:lnRef>
-                <a:fillRef idx="0">
-                  <a:schemeClr val="accent1"/>
-                </a:fillRef>
-                <a:effectRef idx="0">
-                  <a:schemeClr val="accent1"/>
-                </a:effectRef>
-                <a:fontRef idx="minor">
-                  <a:schemeClr val="tx1"/>
-                </a:fontRef>
-              </p:style>
-            </p:cxnSp>
+              <p:txBody>
+                <a:bodyPr wrap="square" rtlCol="0" anchor="ctr" anchorCtr="1">
+                  <a:noAutofit/>
+                </a:bodyPr>
+                <a:lstStyle/>
+                <a:p>
+                  <a:pPr algn="ctr"/>
+                  <a:r>
+                    <a:rPr lang="en-US" altLang="ja-JP" sz="2400" b="1" i="1" dirty="0" smtClean="0">
+                      <a:solidFill>
+                        <a:schemeClr val="bg1">
+                          <a:lumMod val="95000"/>
+                        </a:schemeClr>
+                      </a:solidFill>
+                      <a:latin typeface="Ricty Diminished" charset="0"/>
+                      <a:ea typeface="Ricty Diminished" charset="0"/>
+                      <a:cs typeface="Ricty Diminished" charset="0"/>
+                    </a:rPr>
+                    <a:t>4 USB hosts </a:t>
+                  </a:r>
+                </a:p>
+                <a:p>
+                  <a:pPr algn="ctr"/>
+                  <a:r>
+                    <a:rPr lang="en-US" altLang="ja-JP" sz="2400" b="1" i="1" dirty="0" smtClean="0">
+                      <a:solidFill>
+                        <a:schemeClr val="bg1">
+                          <a:lumMod val="95000"/>
+                        </a:schemeClr>
+                      </a:solidFill>
+                      <a:latin typeface="Ricty Diminished" charset="0"/>
+                      <a:ea typeface="Ricty Diminished" charset="0"/>
+                      <a:cs typeface="Ricty Diminished" charset="0"/>
+                    </a:rPr>
+                    <a:t>x</a:t>
+                  </a:r>
+                </a:p>
+                <a:p>
+                  <a:pPr algn="ctr"/>
+                  <a:r>
+                    <a:rPr lang="en-US" altLang="ja-JP" sz="2400" b="1" i="1" dirty="0" smtClean="0">
+                      <a:solidFill>
+                        <a:schemeClr val="bg1">
+                          <a:lumMod val="95000"/>
+                        </a:schemeClr>
+                      </a:solidFill>
+                      <a:latin typeface="Ricty Diminished" charset="0"/>
+                      <a:ea typeface="Ricty Diminished" charset="0"/>
+                      <a:cs typeface="Ricty Diminished" charset="0"/>
+                    </a:rPr>
+                    <a:t> 3-Port USB hub</a:t>
+                  </a:r>
+                  <a:endParaRPr kumimoji="1" lang="ja-JP" altLang="en-US" sz="2400" b="1" i="1" dirty="0">
+                    <a:solidFill>
+                      <a:schemeClr val="bg1">
+                        <a:lumMod val="95000"/>
+                      </a:schemeClr>
+                    </a:solidFill>
+                    <a:latin typeface="Ricty Diminished" charset="0"/>
+                    <a:ea typeface="Ricty Diminished" charset="0"/>
+                    <a:cs typeface="Ricty Diminished" charset="0"/>
+                  </a:endParaRPr>
+                </a:p>
+              </p:txBody>
+            </p:sp>
           </p:grpSp>
+          <p:pic>
+            <p:nvPicPr>
+              <p:cNvPr id="25" name="図 24"/>
+              <p:cNvPicPr>
+                <a:picLocks noChangeAspect="1"/>
+              </p:cNvPicPr>
+              <p:nvPr/>
+            </p:nvPicPr>
+            <p:blipFill>
+              <a:blip r:embed="rId3">
+                <a:extLst>
+                  <a:ext uri="{28A0092B-C50C-407E-A947-70E740481C1C}">
+                    <a14:useLocalDpi xmlns:a14="http://schemas.microsoft.com/office/drawing/2010/main" val="0"/>
+                  </a:ext>
+                </a:extLst>
+              </a:blip>
+              <a:stretch>
+                <a:fillRect/>
+              </a:stretch>
+            </p:blipFill>
+            <p:spPr>
+              <a:xfrm>
+                <a:off x="8875174" y="4679454"/>
+                <a:ext cx="1345794" cy="1080000"/>
+              </a:xfrm>
+              <a:prstGeom prst="rect">
+                <a:avLst/>
+              </a:prstGeom>
+              <a:grpFill/>
+            </p:spPr>
+          </p:pic>
           <p:sp>
             <p:nvSpPr>
-              <p:cNvPr id="37" name="テキスト ボックス 36"/>
+              <p:cNvPr id="26" name="テキスト ボックス 25"/>
               <p:cNvSpPr txBox="1"/>
               <p:nvPr/>
             </p:nvSpPr>
             <p:spPr>
               <a:xfrm>
-                <a:off x="8880720" y="2510753"/>
+                <a:off x="8875174" y="4818065"/>
                 <a:ext cx="1345794" cy="523220"/>
               </a:xfrm>
               <a:prstGeom prst="rect">
                 <a:avLst/>
               </a:prstGeom>
-              <a:noFill/>
+              <a:grpFill/>
             </p:spPr>
             <p:txBody>
               <a:bodyPr wrap="square" rtlCol="0">
@@ -3851,7 +4219,7 @@
               <a:p>
                 <a:pPr algn="ctr"/>
                 <a:r>
-                  <a:rPr kumimoji="1" lang="en-US" altLang="ja-JP" sz="2800" b="1" dirty="0" smtClean="0">
+                  <a:rPr lang="en-US" altLang="ja-JP" sz="2800" b="1" dirty="0" smtClean="0">
                     <a:solidFill>
                       <a:schemeClr val="bg1">
                         <a:lumMod val="95000"/>
@@ -3861,7 +4229,7 @@
                     <a:ea typeface="Yu Gothic" charset="-128"/>
                     <a:cs typeface="Yu Gothic" charset="-128"/>
                   </a:rPr>
-                  <a:t>Mac</a:t>
+                  <a:t>Linux</a:t>
                 </a:r>
                 <a:endParaRPr kumimoji="1" lang="ja-JP" altLang="en-US" b="1" dirty="0">
                   <a:solidFill>
@@ -3876,239 +4244,7 @@
               </a:p>
             </p:txBody>
           </p:sp>
-          <p:sp>
-            <p:nvSpPr>
-              <p:cNvPr id="38" name="テキスト ボックス 37"/>
-              <p:cNvSpPr txBox="1"/>
-              <p:nvPr/>
-            </p:nvSpPr>
-            <p:spPr>
-              <a:xfrm>
-                <a:off x="8875174" y="1445063"/>
-                <a:ext cx="1345794" cy="523220"/>
-              </a:xfrm>
-              <a:prstGeom prst="rect">
-                <a:avLst/>
-              </a:prstGeom>
-              <a:noFill/>
-            </p:spPr>
-            <p:txBody>
-              <a:bodyPr wrap="square" rtlCol="0">
-                <a:spAutoFit/>
-              </a:bodyPr>
-              <a:lstStyle/>
-              <a:p>
-                <a:pPr algn="ctr"/>
-                <a:r>
-                  <a:rPr kumimoji="1" lang="en-US" altLang="ja-JP" sz="2800" b="1" dirty="0" smtClean="0">
-                    <a:solidFill>
-                      <a:schemeClr val="bg1">
-                        <a:lumMod val="95000"/>
-                      </a:schemeClr>
-                    </a:solidFill>
-                    <a:latin typeface="Yu Gothic" charset="-128"/>
-                    <a:ea typeface="Yu Gothic" charset="-128"/>
-                    <a:cs typeface="Yu Gothic" charset="-128"/>
-                  </a:rPr>
-                  <a:t>PC</a:t>
-                </a:r>
-                <a:endParaRPr kumimoji="1" lang="ja-JP" altLang="en-US" b="1" dirty="0">
-                  <a:solidFill>
-                    <a:schemeClr val="bg1">
-                      <a:lumMod val="95000"/>
-                    </a:schemeClr>
-                  </a:solidFill>
-                  <a:latin typeface="Yu Gothic" charset="-128"/>
-                  <a:ea typeface="Yu Gothic" charset="-128"/>
-                  <a:cs typeface="Yu Gothic" charset="-128"/>
-                </a:endParaRPr>
-              </a:p>
-            </p:txBody>
-          </p:sp>
-          <p:sp>
-            <p:nvSpPr>
-              <p:cNvPr id="39" name="テキスト ボックス 38"/>
-              <p:cNvSpPr txBox="1"/>
-              <p:nvPr/>
-            </p:nvSpPr>
-            <p:spPr>
-              <a:xfrm>
-                <a:off x="8658100" y="3612474"/>
-                <a:ext cx="1345794" cy="523220"/>
-              </a:xfrm>
-              <a:prstGeom prst="rect">
-                <a:avLst/>
-              </a:prstGeom>
-              <a:noFill/>
-            </p:spPr>
-            <p:txBody>
-              <a:bodyPr wrap="square" rtlCol="0">
-                <a:spAutoFit/>
-              </a:bodyPr>
-              <a:lstStyle/>
-              <a:p>
-                <a:pPr algn="ctr"/>
-                <a:r>
-                  <a:rPr kumimoji="1" lang="en-US" altLang="ja-JP" sz="2800" b="1" dirty="0" smtClean="0">
-                    <a:solidFill>
-                      <a:schemeClr val="bg1">
-                        <a:lumMod val="95000"/>
-                      </a:schemeClr>
-                    </a:solidFill>
-                    <a:latin typeface="Yu Gothic" charset="-128"/>
-                    <a:ea typeface="Yu Gothic" charset="-128"/>
-                    <a:cs typeface="Yu Gothic" charset="-128"/>
-                  </a:rPr>
-                  <a:t>XBOX</a:t>
-                </a:r>
-                <a:endParaRPr kumimoji="1" lang="ja-JP" altLang="en-US" sz="2800" b="1" dirty="0">
-                  <a:solidFill>
-                    <a:schemeClr val="bg1">
-                      <a:lumMod val="95000"/>
-                    </a:schemeClr>
-                  </a:solidFill>
-                  <a:latin typeface="Yu Gothic" charset="-128"/>
-                  <a:ea typeface="Yu Gothic" charset="-128"/>
-                  <a:cs typeface="Yu Gothic" charset="-128"/>
-                </a:endParaRPr>
-              </a:p>
-            </p:txBody>
-          </p:sp>
-          <p:sp>
-            <p:nvSpPr>
-              <p:cNvPr id="40" name="テキスト ボックス 39"/>
-              <p:cNvSpPr txBox="1"/>
-              <p:nvPr/>
-            </p:nvSpPr>
-            <p:spPr>
-              <a:xfrm>
-                <a:off x="8658100" y="4648957"/>
-                <a:ext cx="1345794" cy="523220"/>
-              </a:xfrm>
-              <a:prstGeom prst="rect">
-                <a:avLst/>
-              </a:prstGeom>
-              <a:noFill/>
-            </p:spPr>
-            <p:txBody>
-              <a:bodyPr wrap="square" rtlCol="0">
-                <a:spAutoFit/>
-              </a:bodyPr>
-              <a:lstStyle/>
-              <a:p>
-                <a:pPr algn="ctr"/>
-                <a:r>
-                  <a:rPr kumimoji="1" lang="en-US" altLang="ja-JP" sz="2800" b="1" dirty="0" smtClean="0">
-                    <a:solidFill>
-                      <a:schemeClr val="bg1">
-                        <a:lumMod val="95000"/>
-                      </a:schemeClr>
-                    </a:solidFill>
-                    <a:latin typeface="Yu Gothic" charset="-128"/>
-                    <a:ea typeface="Yu Gothic" charset="-128"/>
-                    <a:cs typeface="Yu Gothic" charset="-128"/>
-                  </a:rPr>
-                  <a:t>PS4?</a:t>
-                </a:r>
-                <a:endParaRPr kumimoji="1" lang="ja-JP" altLang="en-US" sz="2800" b="1" dirty="0">
-                  <a:solidFill>
-                    <a:schemeClr val="bg1">
-                      <a:lumMod val="95000"/>
-                    </a:schemeClr>
-                  </a:solidFill>
-                  <a:latin typeface="Yu Gothic" charset="-128"/>
-                  <a:ea typeface="Yu Gothic" charset="-128"/>
-                  <a:cs typeface="Yu Gothic" charset="-128"/>
-                </a:endParaRPr>
-              </a:p>
-            </p:txBody>
-          </p:sp>
         </p:grpSp>
-        <p:sp>
-          <p:nvSpPr>
-            <p:cNvPr id="52" name="テキスト ボックス 51"/>
-            <p:cNvSpPr txBox="1"/>
-            <p:nvPr/>
-          </p:nvSpPr>
-          <p:spPr>
-            <a:xfrm>
-              <a:off x="4722030" y="1711217"/>
-              <a:ext cx="2662574" cy="3442916"/>
-            </a:xfrm>
-            <a:prstGeom prst="rect">
-              <a:avLst/>
-            </a:prstGeom>
-            <a:solidFill>
-              <a:schemeClr val="tx1">
-                <a:alpha val="30000"/>
-              </a:schemeClr>
-            </a:solidFill>
-          </p:spPr>
-          <p:txBody>
-            <a:bodyPr wrap="square" rtlCol="0" anchor="ctr" anchorCtr="1">
-              <a:noAutofit/>
-            </a:bodyPr>
-            <a:lstStyle/>
-            <a:p>
-              <a:pPr algn="ctr"/>
-              <a:r>
-                <a:rPr lang="en-US" altLang="ja-JP" sz="2400" b="1" i="1" dirty="0" smtClean="0">
-                  <a:solidFill>
-                    <a:schemeClr val="bg1">
-                      <a:lumMod val="95000"/>
-                    </a:schemeClr>
-                  </a:solidFill>
-                  <a:latin typeface="Ricty Diminished" charset="0"/>
-                  <a:ea typeface="Ricty Diminished" charset="0"/>
-                  <a:cs typeface="Ricty Diminished" charset="0"/>
-                </a:rPr>
-                <a:t>4 USB hosts </a:t>
-              </a:r>
-            </a:p>
-            <a:p>
-              <a:pPr algn="ctr"/>
-              <a:r>
-                <a:rPr lang="en-US" altLang="ja-JP" sz="2400" b="1" i="1" dirty="0" smtClean="0">
-                  <a:solidFill>
-                    <a:schemeClr val="bg1">
-                      <a:lumMod val="95000"/>
-                    </a:schemeClr>
-                  </a:solidFill>
-                  <a:latin typeface="Ricty Diminished" charset="0"/>
-                  <a:ea typeface="Ricty Diminished" charset="0"/>
-                  <a:cs typeface="Ricty Diminished" charset="0"/>
-                </a:rPr>
-                <a:t>x</a:t>
-              </a:r>
-            </a:p>
-            <a:p>
-              <a:pPr algn="ctr"/>
-              <a:r>
-                <a:rPr lang="en-US" altLang="ja-JP" sz="2400" b="1" i="1" dirty="0" smtClean="0">
-                  <a:solidFill>
-                    <a:schemeClr val="bg1">
-                      <a:lumMod val="95000"/>
-                    </a:schemeClr>
-                  </a:solidFill>
-                  <a:latin typeface="Ricty Diminished" charset="0"/>
-                  <a:ea typeface="Ricty Diminished" charset="0"/>
-                  <a:cs typeface="Ricty Diminished" charset="0"/>
-                </a:rPr>
-                <a:t> 3-Port USB hub</a:t>
-              </a:r>
-              <a:endParaRPr kumimoji="1" lang="ja-JP" altLang="en-US" sz="2400" b="1" i="1" dirty="0">
-                <a:solidFill>
-                  <a:schemeClr val="bg1">
-                    <a:lumMod val="95000"/>
-                  </a:schemeClr>
-                </a:solidFill>
-                <a:latin typeface="Ricty Diminished" charset="0"/>
-                <a:ea typeface="Ricty Diminished" charset="0"/>
-                <a:cs typeface="Ricty Diminished" charset="0"/>
-              </a:endParaRPr>
-            </a:p>
-          </p:txBody>
-        </p:sp>
       </p:grpSp>
     </p:spTree>
     <p:extLst>

</xml_diff>